<commit_message>
Atrito e ISgrounded Implemented
</commit_message>
<xml_diff>
--- a/GDD/Ciclo de trabalho.pptx
+++ b/GDD/Ciclo de trabalho.pptx
@@ -3479,7 +3479,7 @@
           <a:p>
             <a:fld id="{033C220F-AFE8-4CCC-95E1-E0424241E150}" type="datetimeFigureOut">
               <a:rPr lang="pt-BR" smtClean="0"/>
-              <a:t>01/09/2017</a:t>
+              <a:t>13/09/2017</a:t>
             </a:fld>
             <a:endParaRPr lang="pt-BR"/>
           </a:p>
@@ -3649,7 +3649,7 @@
           <a:p>
             <a:fld id="{033C220F-AFE8-4CCC-95E1-E0424241E150}" type="datetimeFigureOut">
               <a:rPr lang="pt-BR" smtClean="0"/>
-              <a:t>01/09/2017</a:t>
+              <a:t>13/09/2017</a:t>
             </a:fld>
             <a:endParaRPr lang="pt-BR"/>
           </a:p>
@@ -3829,7 +3829,7 @@
           <a:p>
             <a:fld id="{033C220F-AFE8-4CCC-95E1-E0424241E150}" type="datetimeFigureOut">
               <a:rPr lang="pt-BR" smtClean="0"/>
-              <a:t>01/09/2017</a:t>
+              <a:t>13/09/2017</a:t>
             </a:fld>
             <a:endParaRPr lang="pt-BR"/>
           </a:p>
@@ -3999,7 +3999,7 @@
           <a:p>
             <a:fld id="{033C220F-AFE8-4CCC-95E1-E0424241E150}" type="datetimeFigureOut">
               <a:rPr lang="pt-BR" smtClean="0"/>
-              <a:t>01/09/2017</a:t>
+              <a:t>13/09/2017</a:t>
             </a:fld>
             <a:endParaRPr lang="pt-BR"/>
           </a:p>
@@ -4245,7 +4245,7 @@
           <a:p>
             <a:fld id="{033C220F-AFE8-4CCC-95E1-E0424241E150}" type="datetimeFigureOut">
               <a:rPr lang="pt-BR" smtClean="0"/>
-              <a:t>01/09/2017</a:t>
+              <a:t>13/09/2017</a:t>
             </a:fld>
             <a:endParaRPr lang="pt-BR"/>
           </a:p>
@@ -4477,7 +4477,7 @@
           <a:p>
             <a:fld id="{033C220F-AFE8-4CCC-95E1-E0424241E150}" type="datetimeFigureOut">
               <a:rPr lang="pt-BR" smtClean="0"/>
-              <a:t>01/09/2017</a:t>
+              <a:t>13/09/2017</a:t>
             </a:fld>
             <a:endParaRPr lang="pt-BR"/>
           </a:p>
@@ -4844,7 +4844,7 @@
           <a:p>
             <a:fld id="{033C220F-AFE8-4CCC-95E1-E0424241E150}" type="datetimeFigureOut">
               <a:rPr lang="pt-BR" smtClean="0"/>
-              <a:t>01/09/2017</a:t>
+              <a:t>13/09/2017</a:t>
             </a:fld>
             <a:endParaRPr lang="pt-BR"/>
           </a:p>
@@ -4962,7 +4962,7 @@
           <a:p>
             <a:fld id="{033C220F-AFE8-4CCC-95E1-E0424241E150}" type="datetimeFigureOut">
               <a:rPr lang="pt-BR" smtClean="0"/>
-              <a:t>01/09/2017</a:t>
+              <a:t>13/09/2017</a:t>
             </a:fld>
             <a:endParaRPr lang="pt-BR"/>
           </a:p>
@@ -5057,7 +5057,7 @@
           <a:p>
             <a:fld id="{033C220F-AFE8-4CCC-95E1-E0424241E150}" type="datetimeFigureOut">
               <a:rPr lang="pt-BR" smtClean="0"/>
-              <a:t>01/09/2017</a:t>
+              <a:t>13/09/2017</a:t>
             </a:fld>
             <a:endParaRPr lang="pt-BR"/>
           </a:p>
@@ -5334,7 +5334,7 @@
           <a:p>
             <a:fld id="{033C220F-AFE8-4CCC-95E1-E0424241E150}" type="datetimeFigureOut">
               <a:rPr lang="pt-BR" smtClean="0"/>
-              <a:t>01/09/2017</a:t>
+              <a:t>13/09/2017</a:t>
             </a:fld>
             <a:endParaRPr lang="pt-BR"/>
           </a:p>
@@ -5587,7 +5587,7 @@
           <a:p>
             <a:fld id="{033C220F-AFE8-4CCC-95E1-E0424241E150}" type="datetimeFigureOut">
               <a:rPr lang="pt-BR" smtClean="0"/>
-              <a:t>01/09/2017</a:t>
+              <a:t>13/09/2017</a:t>
             </a:fld>
             <a:endParaRPr lang="pt-BR"/>
           </a:p>
@@ -5800,7 +5800,7 @@
           <a:p>
             <a:fld id="{033C220F-AFE8-4CCC-95E1-E0424241E150}" type="datetimeFigureOut">
               <a:rPr lang="pt-BR" smtClean="0"/>
-              <a:t>01/09/2017</a:t>
+              <a:t>13/09/2017</a:t>
             </a:fld>
             <a:endParaRPr lang="pt-BR"/>
           </a:p>
@@ -6250,74 +6250,74 @@
           <a:lstStyle/>
           <a:p>
             <a:r>
-              <a:rPr lang="pt-BR" dirty="0" smtClean="0"/>
+              <a:rPr lang="pt-BR" strike="sngStrike" dirty="0" smtClean="0"/>
               <a:t>Primeiro ciclo:</a:t>
             </a:r>
           </a:p>
           <a:p>
             <a:r>
-              <a:rPr lang="pt-BR" dirty="0" smtClean="0"/>
+              <a:rPr lang="pt-BR" strike="sngStrike" dirty="0" smtClean="0"/>
               <a:t>	-criar o mundo do jogo</a:t>
             </a:r>
           </a:p>
           <a:p>
             <a:r>
-              <a:rPr lang="pt-BR" dirty="0"/>
+              <a:rPr lang="pt-BR" strike="sngStrike" dirty="0"/>
               <a:t>	</a:t>
             </a:r>
             <a:r>
-              <a:rPr lang="pt-BR" dirty="0" smtClean="0"/>
+              <a:rPr lang="pt-BR" strike="sngStrike" dirty="0" smtClean="0"/>
               <a:t>-criar um personagem</a:t>
             </a:r>
           </a:p>
           <a:p>
             <a:r>
-              <a:rPr lang="pt-BR" dirty="0"/>
+              <a:rPr lang="pt-BR" strike="sngStrike" dirty="0"/>
               <a:t>	</a:t>
             </a:r>
             <a:r>
-              <a:rPr lang="pt-BR" dirty="0" smtClean="0"/>
+              <a:rPr lang="pt-BR" strike="sngStrike" dirty="0" smtClean="0"/>
               <a:t>- inserir controle horizontal</a:t>
             </a:r>
           </a:p>
           <a:p>
             <a:r>
-              <a:rPr lang="pt-BR" dirty="0"/>
+              <a:rPr lang="pt-BR" strike="sngStrike" dirty="0"/>
               <a:t>	</a:t>
             </a:r>
             <a:r>
-              <a:rPr lang="pt-BR" dirty="0" smtClean="0"/>
+              <a:rPr lang="pt-BR" strike="sngStrike" dirty="0" smtClean="0"/>
               <a:t>- inserir pulo</a:t>
             </a:r>
           </a:p>
           <a:p>
             <a:r>
-              <a:rPr lang="pt-BR" dirty="0"/>
+              <a:rPr lang="pt-BR" strike="sngStrike" dirty="0"/>
               <a:t>	</a:t>
             </a:r>
             <a:r>
-              <a:rPr lang="pt-BR" dirty="0" smtClean="0"/>
+              <a:rPr lang="pt-BR" strike="sngStrike" dirty="0" smtClean="0"/>
               <a:t>- fazer um </a:t>
             </a:r>
             <a:r>
-              <a:rPr lang="pt-BR" dirty="0" err="1" smtClean="0"/>
+              <a:rPr lang="pt-BR" strike="sngStrike" dirty="0" err="1" smtClean="0"/>
               <a:t>level</a:t>
             </a:r>
             <a:r>
-              <a:rPr lang="pt-BR" dirty="0" smtClean="0"/>
+              <a:rPr lang="pt-BR" strike="sngStrike" dirty="0" smtClean="0"/>
               <a:t> com buracos</a:t>
             </a:r>
           </a:p>
           <a:p>
             <a:r>
-              <a:rPr lang="pt-BR" dirty="0"/>
+              <a:rPr lang="pt-BR" strike="sngStrike" dirty="0"/>
               <a:t>	</a:t>
             </a:r>
             <a:r>
-              <a:rPr lang="pt-BR" dirty="0" smtClean="0"/>
+              <a:rPr lang="pt-BR" strike="sngStrike" dirty="0" smtClean="0"/>
               <a:t>- criar menu de inicio</a:t>
             </a:r>
-            <a:endParaRPr lang="pt-BR" dirty="0"/>
+            <a:endParaRPr lang="pt-BR" strike="sngStrike" dirty="0"/>
           </a:p>
         </p:txBody>
       </p:sp>
@@ -6330,6 +6330,115 @@
         <p:spPr>
           <a:xfrm>
             <a:off x="6308521" y="2256721"/>
+            <a:ext cx="6165908" cy="2862322"/>
+          </a:xfrm>
+          <a:prstGeom prst="rect">
+            <a:avLst/>
+          </a:prstGeom>
+          <a:noFill/>
+        </p:spPr>
+        <p:txBody>
+          <a:bodyPr wrap="square" rtlCol="0">
+            <a:spAutoFit/>
+          </a:bodyPr>
+          <a:lstStyle/>
+          <a:p>
+            <a:r>
+              <a:rPr lang="pt-BR" dirty="0" smtClean="0"/>
+              <a:t>Segundo ciclo:</a:t>
+            </a:r>
+          </a:p>
+          <a:p>
+            <a:r>
+              <a:rPr lang="pt-BR" dirty="0"/>
+              <a:t>	</a:t>
+            </a:r>
+            <a:r>
+              <a:rPr lang="pt-BR" strike="sngStrike" dirty="0" smtClean="0"/>
+              <a:t>- iluminação/ distancia de câmera</a:t>
+            </a:r>
+          </a:p>
+          <a:p>
+            <a:r>
+              <a:rPr lang="pt-BR" dirty="0"/>
+              <a:t>	</a:t>
+            </a:r>
+            <a:r>
+              <a:rPr lang="pt-BR" strike="sngStrike" dirty="0" smtClean="0"/>
+              <a:t>- inserir figura do personagem</a:t>
+            </a:r>
+          </a:p>
+          <a:p>
+            <a:r>
+              <a:rPr lang="pt-BR" dirty="0"/>
+              <a:t>	</a:t>
+            </a:r>
+            <a:r>
+              <a:rPr lang="pt-BR" strike="sngStrike" dirty="0" smtClean="0"/>
+              <a:t>- definir esquema de atrito</a:t>
+            </a:r>
+          </a:p>
+          <a:p>
+            <a:r>
+              <a:rPr lang="pt-BR" dirty="0"/>
+              <a:t>	</a:t>
+            </a:r>
+            <a:r>
+              <a:rPr lang="pt-BR" strike="sngStrike" dirty="0" smtClean="0"/>
+              <a:t>- identificação de colisão com o chão</a:t>
+            </a:r>
+          </a:p>
+          <a:p>
+            <a:r>
+              <a:rPr lang="pt-BR" dirty="0"/>
+              <a:t>	</a:t>
+            </a:r>
+            <a:r>
+              <a:rPr lang="pt-BR" dirty="0" smtClean="0"/>
+              <a:t>- criar espetos</a:t>
+            </a:r>
+          </a:p>
+          <a:p>
+            <a:r>
+              <a:rPr lang="pt-BR" dirty="0"/>
+              <a:t>	</a:t>
+            </a:r>
+            <a:r>
+              <a:rPr lang="pt-BR" dirty="0" smtClean="0"/>
+              <a:t>- criar um inimigo</a:t>
+            </a:r>
+          </a:p>
+          <a:p>
+            <a:r>
+              <a:rPr lang="pt-BR" dirty="0"/>
+              <a:t>	</a:t>
+            </a:r>
+            <a:r>
+              <a:rPr lang="pt-BR" dirty="0" smtClean="0"/>
+              <a:t>- fazer um background pro menu</a:t>
+            </a:r>
+          </a:p>
+          <a:p>
+            <a:endParaRPr lang="pt-BR" dirty="0" smtClean="0"/>
+          </a:p>
+          <a:p>
+            <a:r>
+              <a:rPr lang="pt-BR" dirty="0" smtClean="0"/>
+              <a:t>	</a:t>
+            </a:r>
+            <a:endParaRPr lang="pt-BR" dirty="0"/>
+          </a:p>
+        </p:txBody>
+      </p:sp>
+      <p:sp>
+        <p:nvSpPr>
+          <p:cNvPr id="7" name="CaixaDeTexto 6"/>
+          <p:cNvSpPr txBox="1"/>
+          <p:nvPr/>
+        </p:nvSpPr>
+        <p:spPr>
+          <a:xfrm>
+            <a:off x="6308520" y="4487003"/>
             <a:ext cx="5883479" cy="2862322"/>
           </a:xfrm>
           <a:prstGeom prst="rect">
@@ -6345,8 +6454,27 @@
           <a:p>
             <a:r>
               <a:rPr lang="pt-BR" dirty="0" smtClean="0"/>
-              <a:t>Segundo ciclo:</a:t>
-            </a:r>
+              <a:t>Terceiro ciclo:</a:t>
+            </a:r>
+          </a:p>
+          <a:p>
+            <a:r>
+              <a:rPr lang="pt-BR" dirty="0" smtClean="0"/>
+              <a:t>	-</a:t>
+            </a:r>
+            <a:r>
+              <a:rPr lang="pt-BR" dirty="0" err="1" smtClean="0"/>
+              <a:t>backgrund</a:t>
+            </a:r>
+            <a:r>
+              <a:rPr lang="pt-BR" dirty="0" smtClean="0"/>
+              <a:t> do primeiro </a:t>
+            </a:r>
+            <a:r>
+              <a:rPr lang="pt-BR" dirty="0" err="1" smtClean="0"/>
+              <a:t>level</a:t>
+            </a:r>
+            <a:endParaRPr lang="pt-BR" dirty="0" smtClean="0"/>
           </a:p>
           <a:p>
             <a:r>
@@ -6355,8 +6483,13 @@
             </a:r>
             <a:r>
               <a:rPr lang="pt-BR" dirty="0" smtClean="0"/>
-              <a:t>- iluminação/ distancia de câmera</a:t>
-            </a:r>
+              <a:t>-animação </a:t>
+            </a:r>
+            <a:r>
+              <a:rPr lang="pt-BR" dirty="0" err="1" smtClean="0"/>
+              <a:t>idle</a:t>
+            </a:r>
+            <a:endParaRPr lang="pt-BR" dirty="0" smtClean="0"/>
           </a:p>
           <a:p>
             <a:r>
@@ -6365,8 +6498,13 @@
             </a:r>
             <a:r>
               <a:rPr lang="pt-BR" dirty="0" smtClean="0"/>
-              <a:t>- inserir figura do personagem</a:t>
-            </a:r>
+              <a:t>- inserir controle de </a:t>
+            </a:r>
+            <a:r>
+              <a:rPr lang="pt-BR" dirty="0" err="1" smtClean="0"/>
+              <a:t>gamepad</a:t>
+            </a:r>
+            <a:endParaRPr lang="pt-BR" dirty="0" smtClean="0"/>
           </a:p>
           <a:p>
             <a:r>
@@ -6375,7 +6513,15 @@
             </a:r>
             <a:r>
               <a:rPr lang="pt-BR" dirty="0" smtClean="0"/>
-              <a:t>- definir esquema de atrito</a:t>
+              <a:t>- ainda não tem uma habilidade definida então </a:t>
+            </a:r>
+            <a:r>
+              <a:rPr lang="pt-BR" dirty="0"/>
+              <a:t>v</a:t>
+            </a:r>
+            <a:r>
+              <a:rPr lang="pt-BR" dirty="0" smtClean="0"/>
+              <a:t>amos programar e deixar pronto um pulo duplo</a:t>
             </a:r>
           </a:p>
           <a:p>
@@ -6385,7 +6531,7 @@
             </a:r>
             <a:r>
               <a:rPr lang="pt-BR" dirty="0" smtClean="0"/>
-              <a:t>- identificação de colisão com o chão</a:t>
+              <a:t>- criar desenhos para espetos, fogo, choque</a:t>
             </a:r>
           </a:p>
           <a:p>
@@ -6395,7 +6541,7 @@
             </a:r>
             <a:r>
               <a:rPr lang="pt-BR" dirty="0" smtClean="0"/>
-              <a:t>- criar espetos</a:t>
+              <a:t>-criar a IA do inimigo fazendo ele andar</a:t>
             </a:r>
           </a:p>
           <a:p>
@@ -6405,100 +6551,15 @@
             </a:r>
             <a:r>
               <a:rPr lang="pt-BR" dirty="0" smtClean="0"/>
-              <a:t>- criar um inimigo</a:t>
-            </a:r>
-          </a:p>
-          <a:p>
-            <a:r>
-              <a:rPr lang="pt-BR" dirty="0"/>
-              <a:t>	</a:t>
+              <a:t>- fazer o controle por game </a:t>
+            </a:r>
+            <a:r>
+              <a:rPr lang="pt-BR" dirty="0" err="1" smtClean="0"/>
+              <a:t>pad</a:t>
             </a:r>
             <a:r>
               <a:rPr lang="pt-BR" dirty="0" smtClean="0"/>
-              <a:t>- fazer um background pro menu</a:t>
-            </a:r>
-          </a:p>
-          <a:p>
-            <a:endParaRPr lang="pt-BR" dirty="0" smtClean="0"/>
-          </a:p>
-          <a:p>
-            <a:r>
-              <a:rPr lang="pt-BR" dirty="0" smtClean="0"/>
-              <a:t>	</a:t>
-            </a:r>
-            <a:endParaRPr lang="pt-BR" dirty="0"/>
-          </a:p>
-        </p:txBody>
-      </p:sp>
-      <p:sp>
-        <p:nvSpPr>
-          <p:cNvPr id="7" name="CaixaDeTexto 6"/>
-          <p:cNvSpPr txBox="1"/>
-          <p:nvPr/>
-        </p:nvSpPr>
-        <p:spPr>
-          <a:xfrm>
-            <a:off x="6308521" y="4487003"/>
-            <a:ext cx="4721012" cy="1200329"/>
-          </a:xfrm>
-          <a:prstGeom prst="rect">
-            <a:avLst/>
-          </a:prstGeom>
-          <a:noFill/>
-        </p:spPr>
-        <p:txBody>
-          <a:bodyPr wrap="square" rtlCol="0">
-            <a:spAutoFit/>
-          </a:bodyPr>
-          <a:lstStyle/>
-          <a:p>
-            <a:r>
-              <a:rPr lang="pt-BR" dirty="0" smtClean="0"/>
-              <a:t>Terceiro ciclo:</a:t>
-            </a:r>
-          </a:p>
-          <a:p>
-            <a:r>
-              <a:rPr lang="pt-BR" dirty="0" smtClean="0"/>
-              <a:t>	-</a:t>
-            </a:r>
-            <a:r>
-              <a:rPr lang="pt-BR" dirty="0" err="1" smtClean="0"/>
-              <a:t>backgrund</a:t>
-            </a:r>
-            <a:r>
-              <a:rPr lang="pt-BR" dirty="0" smtClean="0"/>
-              <a:t> do primeiro </a:t>
-            </a:r>
-            <a:r>
-              <a:rPr lang="pt-BR" dirty="0" err="1" smtClean="0"/>
-              <a:t>level</a:t>
-            </a:r>
-            <a:endParaRPr lang="pt-BR" dirty="0" smtClean="0"/>
-          </a:p>
-          <a:p>
-            <a:r>
-              <a:rPr lang="pt-BR" dirty="0"/>
-              <a:t>	</a:t>
-            </a:r>
-            <a:r>
-              <a:rPr lang="pt-BR" dirty="0" smtClean="0"/>
-              <a:t>-animação </a:t>
-            </a:r>
-            <a:r>
-              <a:rPr lang="pt-BR" dirty="0" err="1" smtClean="0"/>
-              <a:t>idle</a:t>
-            </a:r>
-            <a:endParaRPr lang="pt-BR" dirty="0" smtClean="0"/>
-          </a:p>
-          <a:p>
-            <a:r>
-              <a:rPr lang="pt-BR" dirty="0"/>
-              <a:t>	</a:t>
-            </a:r>
-            <a:r>
-              <a:rPr lang="pt-BR" dirty="0" smtClean="0"/>
-              <a:t>...</a:t>
+              <a:t> e mouse funcionar nos menus.</a:t>
             </a:r>
             <a:endParaRPr lang="pt-BR" dirty="0"/>
           </a:p>

</xml_diff>

<commit_message>
Skipes / Mik / menino blueprints added.
</commit_message>
<xml_diff>
--- a/GDD/Ciclo de trabalho.pptx
+++ b/GDD/Ciclo de trabalho.pptx
@@ -3479,7 +3479,7 @@
           <a:p>
             <a:fld id="{033C220F-AFE8-4CCC-95E1-E0424241E150}" type="datetimeFigureOut">
               <a:rPr lang="pt-BR" smtClean="0"/>
-              <a:t>13/09/2017</a:t>
+              <a:t>14/09/2017</a:t>
             </a:fld>
             <a:endParaRPr lang="pt-BR"/>
           </a:p>
@@ -3649,7 +3649,7 @@
           <a:p>
             <a:fld id="{033C220F-AFE8-4CCC-95E1-E0424241E150}" type="datetimeFigureOut">
               <a:rPr lang="pt-BR" smtClean="0"/>
-              <a:t>13/09/2017</a:t>
+              <a:t>14/09/2017</a:t>
             </a:fld>
             <a:endParaRPr lang="pt-BR"/>
           </a:p>
@@ -3829,7 +3829,7 @@
           <a:p>
             <a:fld id="{033C220F-AFE8-4CCC-95E1-E0424241E150}" type="datetimeFigureOut">
               <a:rPr lang="pt-BR" smtClean="0"/>
-              <a:t>13/09/2017</a:t>
+              <a:t>14/09/2017</a:t>
             </a:fld>
             <a:endParaRPr lang="pt-BR"/>
           </a:p>
@@ -3999,7 +3999,7 @@
           <a:p>
             <a:fld id="{033C220F-AFE8-4CCC-95E1-E0424241E150}" type="datetimeFigureOut">
               <a:rPr lang="pt-BR" smtClean="0"/>
-              <a:t>13/09/2017</a:t>
+              <a:t>14/09/2017</a:t>
             </a:fld>
             <a:endParaRPr lang="pt-BR"/>
           </a:p>
@@ -4245,7 +4245,7 @@
           <a:p>
             <a:fld id="{033C220F-AFE8-4CCC-95E1-E0424241E150}" type="datetimeFigureOut">
               <a:rPr lang="pt-BR" smtClean="0"/>
-              <a:t>13/09/2017</a:t>
+              <a:t>14/09/2017</a:t>
             </a:fld>
             <a:endParaRPr lang="pt-BR"/>
           </a:p>
@@ -4477,7 +4477,7 @@
           <a:p>
             <a:fld id="{033C220F-AFE8-4CCC-95E1-E0424241E150}" type="datetimeFigureOut">
               <a:rPr lang="pt-BR" smtClean="0"/>
-              <a:t>13/09/2017</a:t>
+              <a:t>14/09/2017</a:t>
             </a:fld>
             <a:endParaRPr lang="pt-BR"/>
           </a:p>
@@ -4844,7 +4844,7 @@
           <a:p>
             <a:fld id="{033C220F-AFE8-4CCC-95E1-E0424241E150}" type="datetimeFigureOut">
               <a:rPr lang="pt-BR" smtClean="0"/>
-              <a:t>13/09/2017</a:t>
+              <a:t>14/09/2017</a:t>
             </a:fld>
             <a:endParaRPr lang="pt-BR"/>
           </a:p>
@@ -4962,7 +4962,7 @@
           <a:p>
             <a:fld id="{033C220F-AFE8-4CCC-95E1-E0424241E150}" type="datetimeFigureOut">
               <a:rPr lang="pt-BR" smtClean="0"/>
-              <a:t>13/09/2017</a:t>
+              <a:t>14/09/2017</a:t>
             </a:fld>
             <a:endParaRPr lang="pt-BR"/>
           </a:p>
@@ -5057,7 +5057,7 @@
           <a:p>
             <a:fld id="{033C220F-AFE8-4CCC-95E1-E0424241E150}" type="datetimeFigureOut">
               <a:rPr lang="pt-BR" smtClean="0"/>
-              <a:t>13/09/2017</a:t>
+              <a:t>14/09/2017</a:t>
             </a:fld>
             <a:endParaRPr lang="pt-BR"/>
           </a:p>
@@ -5334,7 +5334,7 @@
           <a:p>
             <a:fld id="{033C220F-AFE8-4CCC-95E1-E0424241E150}" type="datetimeFigureOut">
               <a:rPr lang="pt-BR" smtClean="0"/>
-              <a:t>13/09/2017</a:t>
+              <a:t>14/09/2017</a:t>
             </a:fld>
             <a:endParaRPr lang="pt-BR"/>
           </a:p>
@@ -5587,7 +5587,7 @@
           <a:p>
             <a:fld id="{033C220F-AFE8-4CCC-95E1-E0424241E150}" type="datetimeFigureOut">
               <a:rPr lang="pt-BR" smtClean="0"/>
-              <a:t>13/09/2017</a:t>
+              <a:t>14/09/2017</a:t>
             </a:fld>
             <a:endParaRPr lang="pt-BR"/>
           </a:p>
@@ -5800,7 +5800,7 @@
           <a:p>
             <a:fld id="{033C220F-AFE8-4CCC-95E1-E0424241E150}" type="datetimeFigureOut">
               <a:rPr lang="pt-BR" smtClean="0"/>
-              <a:t>13/09/2017</a:t>
+              <a:t>14/09/2017</a:t>
             </a:fld>
             <a:endParaRPr lang="pt-BR"/>
           </a:p>
@@ -6330,7 +6330,7 @@
         <p:spPr>
           <a:xfrm>
             <a:off x="6308521" y="2256721"/>
-            <a:ext cx="6165908" cy="2862322"/>
+            <a:ext cx="6165908" cy="3139321"/>
           </a:xfrm>
           <a:prstGeom prst="rect">
             <a:avLst/>
@@ -6394,7 +6394,7 @@
               <a:t>	</a:t>
             </a:r>
             <a:r>
-              <a:rPr lang="pt-BR" dirty="0" smtClean="0"/>
+              <a:rPr lang="pt-BR" strike="sngStrike" dirty="0" smtClean="0"/>
               <a:t>- criar espetos</a:t>
             </a:r>
           </a:p>
@@ -6404,9 +6404,24 @@
               <a:t>	</a:t>
             </a:r>
             <a:r>
-              <a:rPr lang="pt-BR" dirty="0" smtClean="0"/>
-              <a:t>- criar um inimigo</a:t>
-            </a:r>
+              <a:rPr lang="pt-BR" strike="sngStrike" dirty="0" smtClean="0"/>
+              <a:t>- criar um </a:t>
+            </a:r>
+            <a:r>
+              <a:rPr lang="pt-BR" strike="sngStrike" dirty="0" smtClean="0"/>
+              <a:t>inimigo</a:t>
+            </a:r>
+          </a:p>
+          <a:p>
+            <a:r>
+              <a:rPr lang="pt-BR" strike="sngStrike" dirty="0" smtClean="0"/>
+              <a:t>	- inserir controle de </a:t>
+            </a:r>
+            <a:r>
+              <a:rPr lang="pt-BR" strike="sngStrike" dirty="0" err="1" smtClean="0"/>
+              <a:t>gamepad</a:t>
+            </a:r>
+            <a:endParaRPr lang="pt-BR" strike="sngStrike" dirty="0" smtClean="0"/>
           </a:p>
           <a:p>
             <a:r>
@@ -6438,7 +6453,7 @@
         </p:nvSpPr>
         <p:spPr>
           <a:xfrm>
-            <a:off x="6308520" y="4487003"/>
+            <a:off x="6400799" y="4709425"/>
             <a:ext cx="5883479" cy="2862322"/>
           </a:xfrm>
           <a:prstGeom prst="rect">
@@ -6498,30 +6513,13 @@
             </a:r>
             <a:r>
               <a:rPr lang="pt-BR" dirty="0" smtClean="0"/>
-              <a:t>- inserir controle de </a:t>
-            </a:r>
-            <a:r>
-              <a:rPr lang="pt-BR" dirty="0" err="1" smtClean="0"/>
-              <a:t>gamepad</a:t>
-            </a:r>
-            <a:endParaRPr lang="pt-BR" dirty="0" smtClean="0"/>
-          </a:p>
-          <a:p>
-            <a:r>
-              <a:rPr lang="pt-BR" dirty="0"/>
-              <a:t>	</a:t>
-            </a:r>
+              <a:t>- Melhorar percepção do pulo</a:t>
+            </a:r>
+          </a:p>
+          <a:p>
             <a:r>
               <a:rPr lang="pt-BR" dirty="0" smtClean="0"/>
-              <a:t>- ainda não tem uma habilidade definida então </a:t>
-            </a:r>
-            <a:r>
-              <a:rPr lang="pt-BR" dirty="0"/>
-              <a:t>v</a:t>
-            </a:r>
-            <a:r>
-              <a:rPr lang="pt-BR" dirty="0" smtClean="0"/>
-              <a:t>amos programar e deixar pronto um pulo duplo</a:t>
+              <a:t>	- ainda não tem uma habilidade definida então vamos programar e deixar pronto um pulo duplo</a:t>
             </a:r>
           </a:p>
           <a:p>

</xml_diff>

<commit_message>
primeiras animações - iddle MM
</commit_message>
<xml_diff>
--- a/GDD/Ciclo de trabalho.pptx
+++ b/GDD/Ciclo de trabalho.pptx
@@ -3479,7 +3479,7 @@
           <a:p>
             <a:fld id="{033C220F-AFE8-4CCC-95E1-E0424241E150}" type="datetimeFigureOut">
               <a:rPr lang="pt-BR" smtClean="0"/>
-              <a:t>14/09/2017</a:t>
+              <a:t>19/09/2017</a:t>
             </a:fld>
             <a:endParaRPr lang="pt-BR"/>
           </a:p>
@@ -3649,7 +3649,7 @@
           <a:p>
             <a:fld id="{033C220F-AFE8-4CCC-95E1-E0424241E150}" type="datetimeFigureOut">
               <a:rPr lang="pt-BR" smtClean="0"/>
-              <a:t>14/09/2017</a:t>
+              <a:t>19/09/2017</a:t>
             </a:fld>
             <a:endParaRPr lang="pt-BR"/>
           </a:p>
@@ -3829,7 +3829,7 @@
           <a:p>
             <a:fld id="{033C220F-AFE8-4CCC-95E1-E0424241E150}" type="datetimeFigureOut">
               <a:rPr lang="pt-BR" smtClean="0"/>
-              <a:t>14/09/2017</a:t>
+              <a:t>19/09/2017</a:t>
             </a:fld>
             <a:endParaRPr lang="pt-BR"/>
           </a:p>
@@ -3999,7 +3999,7 @@
           <a:p>
             <a:fld id="{033C220F-AFE8-4CCC-95E1-E0424241E150}" type="datetimeFigureOut">
               <a:rPr lang="pt-BR" smtClean="0"/>
-              <a:t>14/09/2017</a:t>
+              <a:t>19/09/2017</a:t>
             </a:fld>
             <a:endParaRPr lang="pt-BR"/>
           </a:p>
@@ -4245,7 +4245,7 @@
           <a:p>
             <a:fld id="{033C220F-AFE8-4CCC-95E1-E0424241E150}" type="datetimeFigureOut">
               <a:rPr lang="pt-BR" smtClean="0"/>
-              <a:t>14/09/2017</a:t>
+              <a:t>19/09/2017</a:t>
             </a:fld>
             <a:endParaRPr lang="pt-BR"/>
           </a:p>
@@ -4477,7 +4477,7 @@
           <a:p>
             <a:fld id="{033C220F-AFE8-4CCC-95E1-E0424241E150}" type="datetimeFigureOut">
               <a:rPr lang="pt-BR" smtClean="0"/>
-              <a:t>14/09/2017</a:t>
+              <a:t>19/09/2017</a:t>
             </a:fld>
             <a:endParaRPr lang="pt-BR"/>
           </a:p>
@@ -4844,7 +4844,7 @@
           <a:p>
             <a:fld id="{033C220F-AFE8-4CCC-95E1-E0424241E150}" type="datetimeFigureOut">
               <a:rPr lang="pt-BR" smtClean="0"/>
-              <a:t>14/09/2017</a:t>
+              <a:t>19/09/2017</a:t>
             </a:fld>
             <a:endParaRPr lang="pt-BR"/>
           </a:p>
@@ -4962,7 +4962,7 @@
           <a:p>
             <a:fld id="{033C220F-AFE8-4CCC-95E1-E0424241E150}" type="datetimeFigureOut">
               <a:rPr lang="pt-BR" smtClean="0"/>
-              <a:t>14/09/2017</a:t>
+              <a:t>19/09/2017</a:t>
             </a:fld>
             <a:endParaRPr lang="pt-BR"/>
           </a:p>
@@ -5057,7 +5057,7 @@
           <a:p>
             <a:fld id="{033C220F-AFE8-4CCC-95E1-E0424241E150}" type="datetimeFigureOut">
               <a:rPr lang="pt-BR" smtClean="0"/>
-              <a:t>14/09/2017</a:t>
+              <a:t>19/09/2017</a:t>
             </a:fld>
             <a:endParaRPr lang="pt-BR"/>
           </a:p>
@@ -5334,7 +5334,7 @@
           <a:p>
             <a:fld id="{033C220F-AFE8-4CCC-95E1-E0424241E150}" type="datetimeFigureOut">
               <a:rPr lang="pt-BR" smtClean="0"/>
-              <a:t>14/09/2017</a:t>
+              <a:t>19/09/2017</a:t>
             </a:fld>
             <a:endParaRPr lang="pt-BR"/>
           </a:p>
@@ -5587,7 +5587,7 @@
           <a:p>
             <a:fld id="{033C220F-AFE8-4CCC-95E1-E0424241E150}" type="datetimeFigureOut">
               <a:rPr lang="pt-BR" smtClean="0"/>
-              <a:t>14/09/2017</a:t>
+              <a:t>19/09/2017</a:t>
             </a:fld>
             <a:endParaRPr lang="pt-BR"/>
           </a:p>
@@ -5800,7 +5800,7 @@
           <a:p>
             <a:fld id="{033C220F-AFE8-4CCC-95E1-E0424241E150}" type="datetimeFigureOut">
               <a:rPr lang="pt-BR" smtClean="0"/>
-              <a:t>14/09/2017</a:t>
+              <a:t>19/09/2017</a:t>
             </a:fld>
             <a:endParaRPr lang="pt-BR"/>
           </a:p>
@@ -6330,7 +6330,7 @@
         <p:spPr>
           <a:xfrm>
             <a:off x="6308521" y="2256721"/>
-            <a:ext cx="6165908" cy="3139321"/>
+            <a:ext cx="6165908" cy="3416320"/>
           </a:xfrm>
           <a:prstGeom prst="rect">
             <a:avLst/>
@@ -6405,11 +6405,7 @@
             </a:r>
             <a:r>
               <a:rPr lang="pt-BR" strike="sngStrike" dirty="0" smtClean="0"/>
-              <a:t>- criar um </a:t>
-            </a:r>
-            <a:r>
-              <a:rPr lang="pt-BR" strike="sngStrike" dirty="0" smtClean="0"/>
-              <a:t>inimigo</a:t>
+              <a:t>- criar um inimigo</a:t>
             </a:r>
           </a:p>
           <a:p>
@@ -6429,9 +6425,12 @@
               <a:t>	</a:t>
             </a:r>
             <a:r>
-              <a:rPr lang="pt-BR" dirty="0" smtClean="0"/>
-              <a:t>- fazer um background pro menu</a:t>
-            </a:r>
+              <a:rPr lang="pt-BR" strike="sngStrike" dirty="0" smtClean="0"/>
+              <a:t>- Fazer um UI com as vidas do personagem</a:t>
+            </a:r>
+          </a:p>
+          <a:p>
+            <a:endParaRPr lang="pt-BR" dirty="0" smtClean="0"/>
           </a:p>
           <a:p>
             <a:endParaRPr lang="pt-BR" dirty="0" smtClean="0"/>
@@ -6475,21 +6474,25 @@
           <a:p>
             <a:r>
               <a:rPr lang="pt-BR" dirty="0" smtClean="0"/>
-              <a:t>	-</a:t>
-            </a:r>
-            <a:r>
-              <a:rPr lang="pt-BR" dirty="0" err="1" smtClean="0"/>
+              <a:t>	</a:t>
+            </a:r>
+            <a:r>
+              <a:rPr lang="pt-BR" strike="sngStrike" dirty="0" smtClean="0"/>
+              <a:t>-</a:t>
+            </a:r>
+            <a:r>
+              <a:rPr lang="pt-BR" strike="sngStrike" dirty="0" err="1" smtClean="0"/>
               <a:t>backgrund</a:t>
             </a:r>
             <a:r>
-              <a:rPr lang="pt-BR" dirty="0" smtClean="0"/>
+              <a:rPr lang="pt-BR" strike="sngStrike" dirty="0" smtClean="0"/>
               <a:t> do primeiro </a:t>
             </a:r>
             <a:r>
-              <a:rPr lang="pt-BR" dirty="0" err="1" smtClean="0"/>
+              <a:rPr lang="pt-BR" strike="sngStrike" dirty="0" err="1" smtClean="0"/>
               <a:t>level</a:t>
             </a:r>
-            <a:endParaRPr lang="pt-BR" dirty="0" smtClean="0"/>
+            <a:endParaRPr lang="pt-BR" strike="sngStrike" dirty="0" smtClean="0"/>
           </a:p>
           <a:p>
             <a:r>

</xml_diff>

<commit_message>
Mik já pode ser morto v1
</commit_message>
<xml_diff>
--- a/GDD/Ciclo de trabalho.pptx
+++ b/GDD/Ciclo de trabalho.pptx
@@ -3479,7 +3479,7 @@
           <a:p>
             <a:fld id="{033C220F-AFE8-4CCC-95E1-E0424241E150}" type="datetimeFigureOut">
               <a:rPr lang="pt-BR" smtClean="0"/>
-              <a:t>04/10/2017</a:t>
+              <a:t>07/10/2017</a:t>
             </a:fld>
             <a:endParaRPr lang="pt-BR"/>
           </a:p>
@@ -3649,7 +3649,7 @@
           <a:p>
             <a:fld id="{033C220F-AFE8-4CCC-95E1-E0424241E150}" type="datetimeFigureOut">
               <a:rPr lang="pt-BR" smtClean="0"/>
-              <a:t>04/10/2017</a:t>
+              <a:t>07/10/2017</a:t>
             </a:fld>
             <a:endParaRPr lang="pt-BR"/>
           </a:p>
@@ -3829,7 +3829,7 @@
           <a:p>
             <a:fld id="{033C220F-AFE8-4CCC-95E1-E0424241E150}" type="datetimeFigureOut">
               <a:rPr lang="pt-BR" smtClean="0"/>
-              <a:t>04/10/2017</a:t>
+              <a:t>07/10/2017</a:t>
             </a:fld>
             <a:endParaRPr lang="pt-BR"/>
           </a:p>
@@ -3999,7 +3999,7 @@
           <a:p>
             <a:fld id="{033C220F-AFE8-4CCC-95E1-E0424241E150}" type="datetimeFigureOut">
               <a:rPr lang="pt-BR" smtClean="0"/>
-              <a:t>04/10/2017</a:t>
+              <a:t>07/10/2017</a:t>
             </a:fld>
             <a:endParaRPr lang="pt-BR"/>
           </a:p>
@@ -4245,7 +4245,7 @@
           <a:p>
             <a:fld id="{033C220F-AFE8-4CCC-95E1-E0424241E150}" type="datetimeFigureOut">
               <a:rPr lang="pt-BR" smtClean="0"/>
-              <a:t>04/10/2017</a:t>
+              <a:t>07/10/2017</a:t>
             </a:fld>
             <a:endParaRPr lang="pt-BR"/>
           </a:p>
@@ -4477,7 +4477,7 @@
           <a:p>
             <a:fld id="{033C220F-AFE8-4CCC-95E1-E0424241E150}" type="datetimeFigureOut">
               <a:rPr lang="pt-BR" smtClean="0"/>
-              <a:t>04/10/2017</a:t>
+              <a:t>07/10/2017</a:t>
             </a:fld>
             <a:endParaRPr lang="pt-BR"/>
           </a:p>
@@ -4844,7 +4844,7 @@
           <a:p>
             <a:fld id="{033C220F-AFE8-4CCC-95E1-E0424241E150}" type="datetimeFigureOut">
               <a:rPr lang="pt-BR" smtClean="0"/>
-              <a:t>04/10/2017</a:t>
+              <a:t>07/10/2017</a:t>
             </a:fld>
             <a:endParaRPr lang="pt-BR"/>
           </a:p>
@@ -4962,7 +4962,7 @@
           <a:p>
             <a:fld id="{033C220F-AFE8-4CCC-95E1-E0424241E150}" type="datetimeFigureOut">
               <a:rPr lang="pt-BR" smtClean="0"/>
-              <a:t>04/10/2017</a:t>
+              <a:t>07/10/2017</a:t>
             </a:fld>
             <a:endParaRPr lang="pt-BR"/>
           </a:p>
@@ -5057,7 +5057,7 @@
           <a:p>
             <a:fld id="{033C220F-AFE8-4CCC-95E1-E0424241E150}" type="datetimeFigureOut">
               <a:rPr lang="pt-BR" smtClean="0"/>
-              <a:t>04/10/2017</a:t>
+              <a:t>07/10/2017</a:t>
             </a:fld>
             <a:endParaRPr lang="pt-BR"/>
           </a:p>
@@ -5334,7 +5334,7 @@
           <a:p>
             <a:fld id="{033C220F-AFE8-4CCC-95E1-E0424241E150}" type="datetimeFigureOut">
               <a:rPr lang="pt-BR" smtClean="0"/>
-              <a:t>04/10/2017</a:t>
+              <a:t>07/10/2017</a:t>
             </a:fld>
             <a:endParaRPr lang="pt-BR"/>
           </a:p>
@@ -5587,7 +5587,7 @@
           <a:p>
             <a:fld id="{033C220F-AFE8-4CCC-95E1-E0424241E150}" type="datetimeFigureOut">
               <a:rPr lang="pt-BR" smtClean="0"/>
-              <a:t>04/10/2017</a:t>
+              <a:t>07/10/2017</a:t>
             </a:fld>
             <a:endParaRPr lang="pt-BR"/>
           </a:p>
@@ -5800,7 +5800,7 @@
           <a:p>
             <a:fld id="{033C220F-AFE8-4CCC-95E1-E0424241E150}" type="datetimeFigureOut">
               <a:rPr lang="pt-BR" smtClean="0"/>
-              <a:t>04/10/2017</a:t>
+              <a:t>07/10/2017</a:t>
             </a:fld>
             <a:endParaRPr lang="pt-BR"/>
           </a:p>
@@ -6399,8 +6399,8 @@
         </p:nvSpPr>
         <p:spPr>
           <a:xfrm>
-            <a:off x="5904237" y="1328814"/>
-            <a:ext cx="5883479" cy="2308324"/>
+            <a:off x="8633256" y="25749"/>
+            <a:ext cx="2125361" cy="1200329"/>
           </a:xfrm>
           <a:prstGeom prst="rect">
             <a:avLst/>
@@ -6414,123 +6414,111 @@
           <a:lstStyle/>
           <a:p>
             <a:r>
-              <a:rPr lang="pt-BR" dirty="0" smtClean="0"/>
+              <a:rPr lang="pt-BR" sz="900" dirty="0" smtClean="0"/>
               <a:t>Terceiro ciclo:</a:t>
             </a:r>
           </a:p>
           <a:p>
             <a:r>
-              <a:rPr lang="pt-BR" dirty="0" smtClean="0"/>
-              <a:t>	</a:t>
-            </a:r>
-            <a:r>
-              <a:rPr lang="pt-BR" strike="sngStrike" dirty="0" smtClean="0"/>
+              <a:rPr lang="pt-BR" sz="900" strike="sngStrike" dirty="0" smtClean="0"/>
               <a:t>-</a:t>
             </a:r>
             <a:r>
-              <a:rPr lang="pt-BR" strike="sngStrike" dirty="0" err="1" smtClean="0"/>
+              <a:rPr lang="pt-BR" sz="900" strike="sngStrike" dirty="0" err="1" smtClean="0"/>
               <a:t>backgrund</a:t>
             </a:r>
             <a:r>
-              <a:rPr lang="pt-BR" strike="sngStrike" dirty="0" smtClean="0"/>
+              <a:rPr lang="pt-BR" sz="900" strike="sngStrike" dirty="0" smtClean="0"/>
               <a:t> do primeiro </a:t>
             </a:r>
             <a:r>
-              <a:rPr lang="pt-BR" strike="sngStrike" dirty="0" err="1" smtClean="0"/>
+              <a:rPr lang="pt-BR" sz="900" strike="sngStrike" dirty="0" err="1" smtClean="0"/>
               <a:t>level</a:t>
             </a:r>
-            <a:endParaRPr lang="pt-BR" strike="sngStrike" dirty="0" smtClean="0"/>
-          </a:p>
-          <a:p>
-            <a:r>
-              <a:rPr lang="pt-BR" dirty="0"/>
-              <a:t>	</a:t>
-            </a:r>
-            <a:r>
-              <a:rPr lang="pt-BR" strike="sngStrike" dirty="0" smtClean="0"/>
-              <a:t>-animação </a:t>
-            </a:r>
-            <a:r>
-              <a:rPr lang="pt-BR" strike="sngStrike" dirty="0" err="1" smtClean="0"/>
+            <a:endParaRPr lang="pt-BR" sz="900" strike="sngStrike" dirty="0" smtClean="0"/>
+          </a:p>
+          <a:p>
+            <a:r>
+              <a:rPr lang="pt-BR" sz="900" strike="sngStrike" dirty="0" smtClean="0"/>
+              <a:t>-</a:t>
+            </a:r>
+            <a:r>
+              <a:rPr lang="pt-BR" sz="900" strike="sngStrike" dirty="0" smtClean="0"/>
+              <a:t>animação </a:t>
+            </a:r>
+            <a:r>
+              <a:rPr lang="pt-BR" sz="900" strike="sngStrike" dirty="0" err="1" smtClean="0"/>
               <a:t>idle</a:t>
             </a:r>
-            <a:endParaRPr lang="pt-BR" strike="sngStrike" dirty="0" smtClean="0"/>
-          </a:p>
-          <a:p>
-            <a:r>
-              <a:rPr lang="pt-BR" dirty="0"/>
-              <a:t>	</a:t>
-            </a:r>
-            <a:r>
-              <a:rPr lang="pt-BR" strike="sngStrike" dirty="0" smtClean="0"/>
-              <a:t>- Melhorar percepção do pulo</a:t>
-            </a:r>
-          </a:p>
-          <a:p>
-            <a:r>
-              <a:rPr lang="pt-BR" dirty="0" smtClean="0"/>
-              <a:t>	</a:t>
-            </a:r>
-            <a:r>
-              <a:rPr lang="pt-BR" strike="sngStrike" dirty="0" smtClean="0"/>
+            <a:endParaRPr lang="pt-BR" sz="900" strike="sngStrike" dirty="0" smtClean="0"/>
+          </a:p>
+          <a:p>
+            <a:r>
+              <a:rPr lang="pt-BR" sz="900" strike="sngStrike" dirty="0" smtClean="0"/>
               <a:t>- </a:t>
             </a:r>
             <a:r>
-              <a:rPr lang="pt-BR" strike="sngStrike" dirty="0" err="1" smtClean="0"/>
+              <a:rPr lang="pt-BR" sz="900" strike="sngStrike" dirty="0" smtClean="0"/>
+              <a:t>Melhorar percepção do pulo</a:t>
+            </a:r>
+          </a:p>
+          <a:p>
+            <a:r>
+              <a:rPr lang="pt-BR" sz="900" strike="sngStrike" dirty="0" smtClean="0"/>
+              <a:t>- </a:t>
+            </a:r>
+            <a:r>
+              <a:rPr lang="pt-BR" sz="900" strike="sngStrike" dirty="0" err="1" smtClean="0"/>
               <a:t>wall</a:t>
             </a:r>
             <a:r>
-              <a:rPr lang="pt-BR" strike="sngStrike" dirty="0" smtClean="0"/>
+              <a:rPr lang="pt-BR" sz="900" strike="sngStrike" dirty="0" smtClean="0"/>
               <a:t> </a:t>
             </a:r>
             <a:r>
-              <a:rPr lang="pt-BR" strike="sngStrike" dirty="0" err="1" smtClean="0"/>
+              <a:rPr lang="pt-BR" sz="900" strike="sngStrike" dirty="0" err="1" smtClean="0"/>
               <a:t>jump</a:t>
             </a:r>
-            <a:endParaRPr lang="pt-BR" strike="sngStrike" dirty="0" smtClean="0"/>
-          </a:p>
-          <a:p>
-            <a:r>
-              <a:rPr lang="pt-BR" dirty="0"/>
-              <a:t>	</a:t>
-            </a:r>
-            <a:r>
-              <a:rPr lang="pt-BR" dirty="0" smtClean="0"/>
+            <a:endParaRPr lang="pt-BR" sz="900" strike="sngStrike" dirty="0" smtClean="0"/>
+          </a:p>
+          <a:p>
+            <a:r>
+              <a:rPr lang="pt-BR" sz="900" dirty="0" smtClean="0"/>
               <a:t>- </a:t>
             </a:r>
             <a:r>
-              <a:rPr lang="pt-BR" strike="sngStrike" dirty="0"/>
+              <a:rPr lang="pt-BR" sz="900" strike="sngStrike" dirty="0"/>
               <a:t>plataformas moveis</a:t>
             </a:r>
           </a:p>
           <a:p>
             <a:r>
-              <a:rPr lang="pt-BR" dirty="0"/>
-              <a:t>	</a:t>
-            </a:r>
-            <a:r>
-              <a:rPr lang="pt-BR" strike="sngStrike" dirty="0" smtClean="0"/>
-              <a:t>- criar a IA do inimigo fazendo ele andar</a:t>
-            </a:r>
-          </a:p>
-          <a:p>
-            <a:r>
-              <a:rPr lang="pt-BR" dirty="0"/>
-              <a:t>	</a:t>
-            </a:r>
-            <a:r>
-              <a:rPr lang="pt-BR" strike="sngStrike" dirty="0" smtClean="0"/>
-              <a:t>- game </a:t>
-            </a:r>
-            <a:r>
-              <a:rPr lang="pt-BR" strike="sngStrike" dirty="0" err="1" smtClean="0"/>
+              <a:rPr lang="pt-BR" sz="900" strike="sngStrike" dirty="0" smtClean="0"/>
+              <a:t>- </a:t>
+            </a:r>
+            <a:r>
+              <a:rPr lang="pt-BR" sz="900" strike="sngStrike" dirty="0" smtClean="0"/>
+              <a:t>criar a IA do inimigo fazendo ele andar</a:t>
+            </a:r>
+          </a:p>
+          <a:p>
+            <a:r>
+              <a:rPr lang="pt-BR" sz="900" strike="sngStrike" dirty="0" smtClean="0"/>
+              <a:t>- </a:t>
+            </a:r>
+            <a:r>
+              <a:rPr lang="pt-BR" sz="900" strike="sngStrike" dirty="0" smtClean="0"/>
+              <a:t>game </a:t>
+            </a:r>
+            <a:r>
+              <a:rPr lang="pt-BR" sz="900" strike="sngStrike" dirty="0" err="1" smtClean="0"/>
               <a:t>pad</a:t>
             </a:r>
             <a:r>
-              <a:rPr lang="pt-BR" strike="sngStrike" dirty="0" smtClean="0"/>
+              <a:rPr lang="pt-BR" sz="900" strike="sngStrike" dirty="0" smtClean="0"/>
               <a:t> funcionar nos menus.</a:t>
             </a:r>
-            <a:endParaRPr lang="pt-BR" strike="sngStrike" dirty="0"/>
+            <a:endParaRPr lang="pt-BR" sz="900" strike="sngStrike" dirty="0"/>
           </a:p>
         </p:txBody>
       </p:sp>
@@ -6542,8 +6530,8 @@
         </p:nvSpPr>
         <p:spPr>
           <a:xfrm>
-            <a:off x="5904238" y="3675609"/>
-            <a:ext cx="5883479" cy="2308324"/>
+            <a:off x="5749254" y="1210282"/>
+            <a:ext cx="5883479" cy="2862322"/>
           </a:xfrm>
           <a:prstGeom prst="rect">
             <a:avLst/>
@@ -6583,38 +6571,206 @@
           <a:p>
             <a:r>
               <a:rPr lang="pt-BR" dirty="0" smtClean="0"/>
-              <a:t>	- 1st </a:t>
+              <a:t>	</a:t>
+            </a:r>
+            <a:r>
+              <a:rPr lang="pt-BR" strike="sngStrike" dirty="0" smtClean="0"/>
+              <a:t>- 1st </a:t>
+            </a:r>
+            <a:r>
+              <a:rPr lang="pt-BR" strike="sngStrike" dirty="0" err="1" smtClean="0"/>
+              <a:t>Level</a:t>
+            </a:r>
+            <a:r>
+              <a:rPr lang="pt-BR" strike="sngStrike" dirty="0" smtClean="0"/>
+              <a:t> </a:t>
+            </a:r>
+            <a:r>
+              <a:rPr lang="pt-BR" strike="sngStrike" dirty="0" err="1" smtClean="0"/>
+              <a:t>Desing</a:t>
+            </a:r>
+            <a:endParaRPr lang="pt-BR" strike="sngStrike" dirty="0" smtClean="0"/>
+          </a:p>
+          <a:p>
+            <a:r>
+              <a:rPr lang="pt-BR" dirty="0"/>
+              <a:t>	</a:t>
+            </a:r>
+            <a:r>
+              <a:rPr lang="pt-BR" strike="sngStrike" dirty="0" smtClean="0"/>
+              <a:t>- </a:t>
+            </a:r>
+            <a:r>
+              <a:rPr lang="pt-BR" strike="sngStrike" dirty="0" smtClean="0"/>
+              <a:t>Corrigir dano e permitir </a:t>
+            </a:r>
+            <a:r>
+              <a:rPr lang="pt-BR" strike="sngStrike" dirty="0" err="1" smtClean="0"/>
+              <a:t>crirar</a:t>
+            </a:r>
+            <a:r>
+              <a:rPr lang="pt-BR" strike="sngStrike" dirty="0" smtClean="0"/>
+              <a:t> mecânica de matar o </a:t>
+            </a:r>
+            <a:r>
+              <a:rPr lang="pt-BR" strike="sngStrike" dirty="0" err="1" smtClean="0"/>
+              <a:t>mik</a:t>
+            </a:r>
+            <a:r>
+              <a:rPr lang="pt-BR" strike="sngStrike" dirty="0" smtClean="0"/>
+              <a:t> </a:t>
+            </a:r>
+            <a:r>
+              <a:rPr lang="pt-BR" dirty="0" smtClean="0"/>
+              <a:t>Fazer o personagem saber que matou o </a:t>
             </a:r>
             <a:r>
               <a:rPr lang="pt-BR" dirty="0" err="1" smtClean="0"/>
-              <a:t>Level</a:t>
-            </a:r>
+              <a:t>mik</a:t>
+            </a:r>
+            <a:r>
+              <a:rPr lang="pt-BR" dirty="0" smtClean="0"/>
+              <a:t> (</a:t>
+            </a:r>
+            <a:r>
+              <a:rPr lang="pt-BR" dirty="0" err="1" smtClean="0"/>
+              <a:t>add</a:t>
+            </a:r>
+            <a:r>
+              <a:rPr lang="pt-BR" dirty="0" smtClean="0"/>
+              <a:t> pulo)</a:t>
+            </a:r>
+            <a:r>
+              <a:rPr lang="pt-BR" dirty="0"/>
+              <a:t>	</a:t>
+            </a:r>
+            <a:endParaRPr lang="pt-BR" dirty="0" smtClean="0"/>
+          </a:p>
+          <a:p>
+            <a:r>
+              <a:rPr lang="pt-BR" dirty="0"/>
+              <a:t>	</a:t>
+            </a:r>
+            <a:r>
+              <a:rPr lang="pt-BR" dirty="0" smtClean="0"/>
+              <a:t>- </a:t>
+            </a:r>
+            <a:r>
+              <a:rPr lang="pt-BR" dirty="0" smtClean="0"/>
+              <a:t>rever atrito no ar </a:t>
+            </a:r>
+          </a:p>
+          <a:p>
+            <a:r>
+              <a:rPr lang="pt-BR" dirty="0" smtClean="0"/>
+              <a:t>	- Dash? (invulnerável?)</a:t>
+            </a:r>
+          </a:p>
+          <a:p>
+            <a:r>
+              <a:rPr lang="pt-BR" dirty="0"/>
+              <a:t>	</a:t>
+            </a:r>
+            <a:r>
+              <a:rPr lang="pt-BR" dirty="0" smtClean="0"/>
+              <a:t>- criar </a:t>
+            </a:r>
+            <a:r>
+              <a:rPr lang="pt-BR" dirty="0"/>
+              <a:t>desenhos para espetos, fogo, choque</a:t>
+            </a:r>
+          </a:p>
+          <a:p>
             <a:r>
               <a:rPr lang="pt-BR" dirty="0" smtClean="0"/>
               <a:t> </a:t>
             </a:r>
             <a:r>
-              <a:rPr lang="pt-BR" dirty="0" err="1" smtClean="0"/>
-              <a:t>Desing</a:t>
-            </a:r>
-            <a:endParaRPr lang="pt-BR" dirty="0" smtClean="0"/>
-          </a:p>
-          <a:p>
-            <a:r>
               <a:rPr lang="pt-BR" dirty="0"/>
               <a:t>	</a:t>
             </a:r>
             <a:r>
               <a:rPr lang="pt-BR" dirty="0" smtClean="0"/>
-              <a:t>- animação </a:t>
+              <a:t>- Mecânicas do  primeiro chefão</a:t>
+            </a:r>
+          </a:p>
+          <a:p>
+            <a:r>
+              <a:rPr lang="pt-BR" dirty="0"/>
+              <a:t>	</a:t>
+            </a:r>
+            <a:r>
+              <a:rPr lang="pt-BR" dirty="0" smtClean="0"/>
+              <a:t>- melhorar código dos corações e adicionar vidas</a:t>
+            </a:r>
+            <a:endParaRPr lang="pt-BR" dirty="0"/>
+          </a:p>
+        </p:txBody>
+      </p:sp>
+      <p:sp>
+        <p:nvSpPr>
+          <p:cNvPr id="9" name="CaixaDeTexto 8"/>
+          <p:cNvSpPr txBox="1"/>
+          <p:nvPr/>
+        </p:nvSpPr>
+        <p:spPr>
+          <a:xfrm>
+            <a:off x="5588617" y="3995678"/>
+            <a:ext cx="5883479" cy="2862322"/>
+          </a:xfrm>
+          <a:prstGeom prst="rect">
+            <a:avLst/>
+          </a:prstGeom>
+          <a:noFill/>
+        </p:spPr>
+        <p:txBody>
+          <a:bodyPr wrap="square" rtlCol="0">
+            <a:spAutoFit/>
+          </a:bodyPr>
+          <a:lstStyle/>
+          <a:p>
+            <a:r>
+              <a:rPr lang="pt-BR" dirty="0" smtClean="0"/>
+              <a:t>Quinto </a:t>
+            </a:r>
+            <a:r>
+              <a:rPr lang="pt-BR" dirty="0" smtClean="0"/>
+              <a:t>ciclo</a:t>
+            </a:r>
+            <a:r>
+              <a:rPr lang="pt-BR" dirty="0" smtClean="0">
+                <a:sym typeface="Wingdings" panose="05000000000000000000" pitchFamily="2" charset="2"/>
+              </a:rPr>
+              <a:t>:</a:t>
+            </a:r>
+            <a:endParaRPr lang="pt-BR" dirty="0" smtClean="0"/>
+          </a:p>
+          <a:p>
+            <a:r>
+              <a:rPr lang="pt-BR" dirty="0" smtClean="0"/>
+              <a:t>	</a:t>
+            </a:r>
+            <a:r>
+              <a:rPr lang="pt-BR" dirty="0" smtClean="0"/>
+              <a:t>- Remodelar </a:t>
             </a:r>
             <a:r>
               <a:rPr lang="pt-BR" dirty="0" err="1" smtClean="0"/>
-              <a:t>walking</a:t>
+              <a:t>level</a:t>
             </a:r>
             <a:r>
               <a:rPr lang="pt-BR" dirty="0" smtClean="0"/>
-              <a:t> // Melhorar </a:t>
+              <a:t> 1 com tiles simples ou copiados</a:t>
+            </a:r>
+          </a:p>
+          <a:p>
+            <a:r>
+              <a:rPr lang="pt-BR" dirty="0"/>
+              <a:t>	</a:t>
+            </a:r>
+            <a:r>
+              <a:rPr lang="pt-BR" dirty="0" smtClean="0"/>
+              <a:t>- Montar animações de pulo corrida e </a:t>
             </a:r>
             <a:r>
               <a:rPr lang="pt-BR" dirty="0" err="1" smtClean="0"/>
@@ -6629,34 +6785,57 @@
             </a:r>
             <a:r>
               <a:rPr lang="pt-BR" dirty="0" smtClean="0"/>
-              <a:t>- rever atrito no ar </a:t>
-            </a:r>
-          </a:p>
-          <a:p>
+              <a:t>-Wall </a:t>
+            </a:r>
+            <a:r>
+              <a:rPr lang="pt-BR" dirty="0" err="1" smtClean="0"/>
+              <a:t>jump</a:t>
+            </a:r>
             <a:r>
               <a:rPr lang="pt-BR" dirty="0" smtClean="0"/>
-              <a:t>	- Dash? (invulnerável?)</a:t>
+              <a:t> – restringir o controle do player para que ele não sabote o próprio pulo na parede</a:t>
             </a:r>
           </a:p>
           <a:p>
             <a:r>
               <a:rPr lang="pt-BR" dirty="0"/>
-              <a:t>	-criar desenhos para espetos, fogo, choque</a:t>
-            </a:r>
-          </a:p>
-          <a:p>
+              <a:t>	</a:t>
+            </a:r>
+            <a:r>
+              <a:rPr lang="pt-BR" dirty="0" smtClean="0"/>
+              <a:t>- programar o </a:t>
+            </a:r>
+            <a:r>
+              <a:rPr lang="pt-BR" dirty="0" err="1" smtClean="0"/>
+              <a:t>wall</a:t>
+            </a:r>
             <a:r>
               <a:rPr lang="pt-BR" dirty="0" smtClean="0"/>
               <a:t> </a:t>
             </a:r>
             <a:r>
+              <a:rPr lang="pt-BR" dirty="0" err="1" smtClean="0"/>
+              <a:t>jump</a:t>
+            </a:r>
+            <a:r>
+              <a:rPr lang="pt-BR" dirty="0" smtClean="0"/>
+              <a:t> para ser coletável, isso servirá para outras habilidades.</a:t>
+            </a:r>
+          </a:p>
+          <a:p>
+            <a:r>
               <a:rPr lang="pt-BR" dirty="0"/>
               <a:t>	</a:t>
             </a:r>
             <a:r>
               <a:rPr lang="pt-BR" dirty="0" smtClean="0"/>
-              <a:t>- Mecânicas do  primeiro chefão</a:t>
-            </a:r>
+              <a:t>- animação </a:t>
+            </a:r>
+            <a:r>
+              <a:rPr lang="pt-BR" dirty="0" err="1" smtClean="0"/>
+              <a:t>mik</a:t>
+            </a:r>
+            <a:endParaRPr lang="pt-BR" dirty="0" smtClean="0"/>
           </a:p>
           <a:p>
             <a:r>
@@ -6665,7 +6844,23 @@
             </a:r>
             <a:r>
               <a:rPr lang="pt-BR" dirty="0" smtClean="0"/>
-              <a:t>- melhorar código dos corações e adicionar vidas</a:t>
+              <a:t>- Fazer ser visível qual o botão selecionado mesmo com o </a:t>
+            </a:r>
+            <a:r>
+              <a:rPr lang="pt-BR" dirty="0" err="1" smtClean="0"/>
+              <a:t>gamepad</a:t>
+            </a:r>
+            <a:r>
+              <a:rPr lang="pt-BR" dirty="0" smtClean="0"/>
+              <a:t> (mouse já é de boa com a função </a:t>
+            </a:r>
+            <a:r>
+              <a:rPr lang="pt-BR" dirty="0" err="1" smtClean="0"/>
+              <a:t>hover</a:t>
+            </a:r>
+            <a:r>
+              <a:rPr lang="pt-BR" dirty="0" smtClean="0"/>
+              <a:t>).</a:t>
             </a:r>
             <a:endParaRPr lang="pt-BR" dirty="0"/>
           </a:p>

</xml_diff>

<commit_message>
now can jump on mik's head - very bad implemantation :( but works :D
</commit_message>
<xml_diff>
--- a/GDD/Ciclo de trabalho.pptx
+++ b/GDD/Ciclo de trabalho.pptx
@@ -3479,7 +3479,7 @@
           <a:p>
             <a:fld id="{033C220F-AFE8-4CCC-95E1-E0424241E150}" type="datetimeFigureOut">
               <a:rPr lang="pt-BR" smtClean="0"/>
-              <a:t>07/10/2017</a:t>
+              <a:t>08/10/2017</a:t>
             </a:fld>
             <a:endParaRPr lang="pt-BR"/>
           </a:p>
@@ -3649,7 +3649,7 @@
           <a:p>
             <a:fld id="{033C220F-AFE8-4CCC-95E1-E0424241E150}" type="datetimeFigureOut">
               <a:rPr lang="pt-BR" smtClean="0"/>
-              <a:t>07/10/2017</a:t>
+              <a:t>08/10/2017</a:t>
             </a:fld>
             <a:endParaRPr lang="pt-BR"/>
           </a:p>
@@ -3829,7 +3829,7 @@
           <a:p>
             <a:fld id="{033C220F-AFE8-4CCC-95E1-E0424241E150}" type="datetimeFigureOut">
               <a:rPr lang="pt-BR" smtClean="0"/>
-              <a:t>07/10/2017</a:t>
+              <a:t>08/10/2017</a:t>
             </a:fld>
             <a:endParaRPr lang="pt-BR"/>
           </a:p>
@@ -3999,7 +3999,7 @@
           <a:p>
             <a:fld id="{033C220F-AFE8-4CCC-95E1-E0424241E150}" type="datetimeFigureOut">
               <a:rPr lang="pt-BR" smtClean="0"/>
-              <a:t>07/10/2017</a:t>
+              <a:t>08/10/2017</a:t>
             </a:fld>
             <a:endParaRPr lang="pt-BR"/>
           </a:p>
@@ -4245,7 +4245,7 @@
           <a:p>
             <a:fld id="{033C220F-AFE8-4CCC-95E1-E0424241E150}" type="datetimeFigureOut">
               <a:rPr lang="pt-BR" smtClean="0"/>
-              <a:t>07/10/2017</a:t>
+              <a:t>08/10/2017</a:t>
             </a:fld>
             <a:endParaRPr lang="pt-BR"/>
           </a:p>
@@ -4477,7 +4477,7 @@
           <a:p>
             <a:fld id="{033C220F-AFE8-4CCC-95E1-E0424241E150}" type="datetimeFigureOut">
               <a:rPr lang="pt-BR" smtClean="0"/>
-              <a:t>07/10/2017</a:t>
+              <a:t>08/10/2017</a:t>
             </a:fld>
             <a:endParaRPr lang="pt-BR"/>
           </a:p>
@@ -4844,7 +4844,7 @@
           <a:p>
             <a:fld id="{033C220F-AFE8-4CCC-95E1-E0424241E150}" type="datetimeFigureOut">
               <a:rPr lang="pt-BR" smtClean="0"/>
-              <a:t>07/10/2017</a:t>
+              <a:t>08/10/2017</a:t>
             </a:fld>
             <a:endParaRPr lang="pt-BR"/>
           </a:p>
@@ -4962,7 +4962,7 @@
           <a:p>
             <a:fld id="{033C220F-AFE8-4CCC-95E1-E0424241E150}" type="datetimeFigureOut">
               <a:rPr lang="pt-BR" smtClean="0"/>
-              <a:t>07/10/2017</a:t>
+              <a:t>08/10/2017</a:t>
             </a:fld>
             <a:endParaRPr lang="pt-BR"/>
           </a:p>
@@ -5057,7 +5057,7 @@
           <a:p>
             <a:fld id="{033C220F-AFE8-4CCC-95E1-E0424241E150}" type="datetimeFigureOut">
               <a:rPr lang="pt-BR" smtClean="0"/>
-              <a:t>07/10/2017</a:t>
+              <a:t>08/10/2017</a:t>
             </a:fld>
             <a:endParaRPr lang="pt-BR"/>
           </a:p>
@@ -5334,7 +5334,7 @@
           <a:p>
             <a:fld id="{033C220F-AFE8-4CCC-95E1-E0424241E150}" type="datetimeFigureOut">
               <a:rPr lang="pt-BR" smtClean="0"/>
-              <a:t>07/10/2017</a:t>
+              <a:t>08/10/2017</a:t>
             </a:fld>
             <a:endParaRPr lang="pt-BR"/>
           </a:p>
@@ -5587,7 +5587,7 @@
           <a:p>
             <a:fld id="{033C220F-AFE8-4CCC-95E1-E0424241E150}" type="datetimeFigureOut">
               <a:rPr lang="pt-BR" smtClean="0"/>
-              <a:t>07/10/2017</a:t>
+              <a:t>08/10/2017</a:t>
             </a:fld>
             <a:endParaRPr lang="pt-BR"/>
           </a:p>
@@ -5800,7 +5800,7 @@
           <a:p>
             <a:fld id="{033C220F-AFE8-4CCC-95E1-E0424241E150}" type="datetimeFigureOut">
               <a:rPr lang="pt-BR" smtClean="0"/>
-              <a:t>07/10/2017</a:t>
+              <a:t>08/10/2017</a:t>
             </a:fld>
             <a:endParaRPr lang="pt-BR"/>
           </a:p>
@@ -6440,11 +6440,7 @@
           <a:p>
             <a:r>
               <a:rPr lang="pt-BR" sz="900" strike="sngStrike" dirty="0" smtClean="0"/>
-              <a:t>-</a:t>
-            </a:r>
-            <a:r>
-              <a:rPr lang="pt-BR" sz="900" strike="sngStrike" dirty="0" smtClean="0"/>
-              <a:t>animação </a:t>
+              <a:t>-animação </a:t>
             </a:r>
             <a:r>
               <a:rPr lang="pt-BR" sz="900" strike="sngStrike" dirty="0" err="1" smtClean="0"/>
@@ -6455,11 +6451,7 @@
           <a:p>
             <a:r>
               <a:rPr lang="pt-BR" sz="900" strike="sngStrike" dirty="0" smtClean="0"/>
-              <a:t>- </a:t>
-            </a:r>
-            <a:r>
-              <a:rPr lang="pt-BR" sz="900" strike="sngStrike" dirty="0" smtClean="0"/>
-              <a:t>Melhorar percepção do pulo</a:t>
+              <a:t>- Melhorar percepção do pulo</a:t>
             </a:r>
           </a:p>
           <a:p>
@@ -6494,21 +6486,13 @@
           <a:p>
             <a:r>
               <a:rPr lang="pt-BR" sz="900" strike="sngStrike" dirty="0" smtClean="0"/>
-              <a:t>- </a:t>
-            </a:r>
+              <a:t>- criar a IA do inimigo fazendo ele andar</a:t>
+            </a:r>
+          </a:p>
+          <a:p>
             <a:r>
               <a:rPr lang="pt-BR" sz="900" strike="sngStrike" dirty="0" smtClean="0"/>
-              <a:t>criar a IA do inimigo fazendo ele andar</a:t>
-            </a:r>
-          </a:p>
-          <a:p>
-            <a:r>
-              <a:rPr lang="pt-BR" sz="900" strike="sngStrike" dirty="0" smtClean="0"/>
-              <a:t>- </a:t>
-            </a:r>
-            <a:r>
-              <a:rPr lang="pt-BR" sz="900" strike="sngStrike" dirty="0" smtClean="0"/>
-              <a:t>game </a:t>
+              <a:t>- game </a:t>
             </a:r>
             <a:r>
               <a:rPr lang="pt-BR" sz="900" strike="sngStrike" dirty="0" err="1" smtClean="0"/>
@@ -6598,11 +6582,7 @@
             </a:r>
             <a:r>
               <a:rPr lang="pt-BR" strike="sngStrike" dirty="0" smtClean="0"/>
-              <a:t>- </a:t>
-            </a:r>
-            <a:r>
-              <a:rPr lang="pt-BR" strike="sngStrike" dirty="0" smtClean="0"/>
-              <a:t>Corrigir dano e permitir </a:t>
+              <a:t>- Corrigir dano e permitir </a:t>
             </a:r>
             <a:r>
               <a:rPr lang="pt-BR" strike="sngStrike" dirty="0" err="1" smtClean="0"/>
@@ -6653,11 +6633,7 @@
             </a:r>
             <a:r>
               <a:rPr lang="pt-BR" dirty="0" smtClean="0"/>
-              <a:t>- </a:t>
-            </a:r>
-            <a:r>
-              <a:rPr lang="pt-BR" dirty="0" smtClean="0"/>
-              <a:t>rever atrito no ar </a:t>
+              <a:t>- rever atrito no ar </a:t>
             </a:r>
           </a:p>
           <a:p>
@@ -6731,11 +6707,7 @@
           <a:p>
             <a:r>
               <a:rPr lang="pt-BR" dirty="0" smtClean="0"/>
-              <a:t>Quinto </a:t>
-            </a:r>
-            <a:r>
-              <a:rPr lang="pt-BR" dirty="0" smtClean="0"/>
-              <a:t>ciclo</a:t>
+              <a:t>Quinto ciclo</a:t>
             </a:r>
             <a:r>
               <a:rPr lang="pt-BR" dirty="0" smtClean="0">
@@ -6748,11 +6720,7 @@
           <a:p>
             <a:r>
               <a:rPr lang="pt-BR" dirty="0" smtClean="0"/>
-              <a:t>	</a:t>
-            </a:r>
-            <a:r>
-              <a:rPr lang="pt-BR" dirty="0" smtClean="0"/>
-              <a:t>- Remodelar </a:t>
+              <a:t>	- Remodelar </a:t>
             </a:r>
             <a:r>
               <a:rPr lang="pt-BR" dirty="0" err="1" smtClean="0"/>

</xml_diff>